<commit_message>
Updated application overview to the final version
</commit_message>
<xml_diff>
--- a/Documentation/Application Overview.pptx
+++ b/Documentation/Application Overview.pptx
@@ -14,10 +14,11 @@
     <p:sldId id="259" r:id="rId8"/>
     <p:sldId id="268" r:id="rId9"/>
     <p:sldId id="269" r:id="rId10"/>
-    <p:sldId id="264" r:id="rId11"/>
-    <p:sldId id="262" r:id="rId12"/>
-    <p:sldId id="265" r:id="rId13"/>
-    <p:sldId id="266" r:id="rId14"/>
+    <p:sldId id="270" r:id="rId11"/>
+    <p:sldId id="264" r:id="rId12"/>
+    <p:sldId id="262" r:id="rId13"/>
+    <p:sldId id="265" r:id="rId14"/>
+    <p:sldId id="266" r:id="rId15"/>
   </p:sldIdLst>
   <p:sldSz cx="12192000" cy="6858000"/>
   <p:notesSz cx="6858000" cy="9144000"/>
@@ -273,7 +274,7 @@
           <a:p>
             <a:fld id="{3BF2E1DF-9A38-404F-ABF7-DEB7882DD504}" type="datetimeFigureOut">
               <a:rPr lang="it-IT" smtClean="0"/>
-              <a:t>14/06/2021</a:t>
+              <a:t>21/06/2021</a:t>
             </a:fld>
             <a:endParaRPr lang="it-IT"/>
           </a:p>
@@ -473,7 +474,7 @@
           <a:p>
             <a:fld id="{3BF2E1DF-9A38-404F-ABF7-DEB7882DD504}" type="datetimeFigureOut">
               <a:rPr lang="it-IT" smtClean="0"/>
-              <a:t>14/06/2021</a:t>
+              <a:t>21/06/2021</a:t>
             </a:fld>
             <a:endParaRPr lang="it-IT"/>
           </a:p>
@@ -683,7 +684,7 @@
           <a:p>
             <a:fld id="{3BF2E1DF-9A38-404F-ABF7-DEB7882DD504}" type="datetimeFigureOut">
               <a:rPr lang="it-IT" smtClean="0"/>
-              <a:t>14/06/2021</a:t>
+              <a:t>21/06/2021</a:t>
             </a:fld>
             <a:endParaRPr lang="it-IT"/>
           </a:p>
@@ -883,7 +884,7 @@
           <a:p>
             <a:fld id="{3BF2E1DF-9A38-404F-ABF7-DEB7882DD504}" type="datetimeFigureOut">
               <a:rPr lang="it-IT" smtClean="0"/>
-              <a:t>14/06/2021</a:t>
+              <a:t>21/06/2021</a:t>
             </a:fld>
             <a:endParaRPr lang="it-IT"/>
           </a:p>
@@ -1159,7 +1160,7 @@
           <a:p>
             <a:fld id="{3BF2E1DF-9A38-404F-ABF7-DEB7882DD504}" type="datetimeFigureOut">
               <a:rPr lang="it-IT" smtClean="0"/>
-              <a:t>14/06/2021</a:t>
+              <a:t>21/06/2021</a:t>
             </a:fld>
             <a:endParaRPr lang="it-IT"/>
           </a:p>
@@ -1427,7 +1428,7 @@
           <a:p>
             <a:fld id="{3BF2E1DF-9A38-404F-ABF7-DEB7882DD504}" type="datetimeFigureOut">
               <a:rPr lang="it-IT" smtClean="0"/>
-              <a:t>14/06/2021</a:t>
+              <a:t>21/06/2021</a:t>
             </a:fld>
             <a:endParaRPr lang="it-IT"/>
           </a:p>
@@ -1842,7 +1843,7 @@
           <a:p>
             <a:fld id="{3BF2E1DF-9A38-404F-ABF7-DEB7882DD504}" type="datetimeFigureOut">
               <a:rPr lang="it-IT" smtClean="0"/>
-              <a:t>14/06/2021</a:t>
+              <a:t>21/06/2021</a:t>
             </a:fld>
             <a:endParaRPr lang="it-IT"/>
           </a:p>
@@ -1984,7 +1985,7 @@
           <a:p>
             <a:fld id="{3BF2E1DF-9A38-404F-ABF7-DEB7882DD504}" type="datetimeFigureOut">
               <a:rPr lang="it-IT" smtClean="0"/>
-              <a:t>14/06/2021</a:t>
+              <a:t>21/06/2021</a:t>
             </a:fld>
             <a:endParaRPr lang="it-IT"/>
           </a:p>
@@ -2097,7 +2098,7 @@
           <a:p>
             <a:fld id="{3BF2E1DF-9A38-404F-ABF7-DEB7882DD504}" type="datetimeFigureOut">
               <a:rPr lang="it-IT" smtClean="0"/>
-              <a:t>14/06/2021</a:t>
+              <a:t>21/06/2021</a:t>
             </a:fld>
             <a:endParaRPr lang="it-IT"/>
           </a:p>
@@ -2410,7 +2411,7 @@
           <a:p>
             <a:fld id="{3BF2E1DF-9A38-404F-ABF7-DEB7882DD504}" type="datetimeFigureOut">
               <a:rPr lang="it-IT" smtClean="0"/>
-              <a:t>14/06/2021</a:t>
+              <a:t>21/06/2021</a:t>
             </a:fld>
             <a:endParaRPr lang="it-IT"/>
           </a:p>
@@ -2699,7 +2700,7 @@
           <a:p>
             <a:fld id="{3BF2E1DF-9A38-404F-ABF7-DEB7882DD504}" type="datetimeFigureOut">
               <a:rPr lang="it-IT" smtClean="0"/>
-              <a:t>14/06/2021</a:t>
+              <a:t>21/06/2021</a:t>
             </a:fld>
             <a:endParaRPr lang="it-IT"/>
           </a:p>
@@ -2942,7 +2943,7 @@
           <a:p>
             <a:fld id="{3BF2E1DF-9A38-404F-ABF7-DEB7882DD504}" type="datetimeFigureOut">
               <a:rPr lang="it-IT" smtClean="0"/>
-              <a:t>14/06/2021</a:t>
+              <a:t>21/06/2021</a:t>
             </a:fld>
             <a:endParaRPr lang="it-IT"/>
           </a:p>
@@ -3576,6 +3577,561 @@
                 <a:latin typeface="Roboto" panose="02000000000000000000" pitchFamily="2" charset="0"/>
                 <a:ea typeface="Roboto" panose="02000000000000000000" pitchFamily="2" charset="0"/>
               </a:rPr>
+              <a:t>BUSINESS</a:t>
+            </a:r>
+          </a:p>
+        </p:txBody>
+      </p:sp>
+      <p:grpSp>
+        <p:nvGrpSpPr>
+          <p:cNvPr id="4" name="Group 3">
+            <a:extLst>
+              <a:ext uri="{FF2B5EF4-FFF2-40B4-BE49-F238E27FC236}">
+                <a16:creationId xmlns:a16="http://schemas.microsoft.com/office/drawing/2014/main" id="{0607786B-908E-4A45-8F87-105530E81CC7}"/>
+              </a:ext>
+            </a:extLst>
+          </p:cNvPr>
+          <p:cNvGrpSpPr/>
+          <p:nvPr/>
+        </p:nvGrpSpPr>
+        <p:grpSpPr>
+          <a:xfrm>
+            <a:off x="431800" y="1994240"/>
+            <a:ext cx="11269870" cy="814060"/>
+            <a:chOff x="431800" y="1994240"/>
+            <a:chExt cx="11269870" cy="814060"/>
+          </a:xfrm>
+        </p:grpSpPr>
+        <p:grpSp>
+          <p:nvGrpSpPr>
+            <p:cNvPr id="16" name="Group 15">
+              <a:extLst>
+                <a:ext uri="{FF2B5EF4-FFF2-40B4-BE49-F238E27FC236}">
+                  <a16:creationId xmlns:a16="http://schemas.microsoft.com/office/drawing/2014/main" id="{FA1F6881-9AF7-4DFE-ADF6-60487BBCFEA3}"/>
+                </a:ext>
+              </a:extLst>
+            </p:cNvPr>
+            <p:cNvGrpSpPr/>
+            <p:nvPr/>
+          </p:nvGrpSpPr>
+          <p:grpSpPr>
+            <a:xfrm>
+              <a:off x="9065724" y="1994240"/>
+              <a:ext cx="2635946" cy="814060"/>
+              <a:chOff x="8530701" y="1550355"/>
+              <a:chExt cx="2635946" cy="814060"/>
+            </a:xfrm>
+          </p:grpSpPr>
+          <p:grpSp>
+            <p:nvGrpSpPr>
+              <p:cNvPr id="11" name="Group 10">
+                <a:extLst>
+                  <a:ext uri="{FF2B5EF4-FFF2-40B4-BE49-F238E27FC236}">
+                    <a16:creationId xmlns:a16="http://schemas.microsoft.com/office/drawing/2014/main" id="{1007905C-9B7A-4D50-A361-63F15270ACEE}"/>
+                  </a:ext>
+                </a:extLst>
+              </p:cNvPr>
+              <p:cNvGrpSpPr/>
+              <p:nvPr/>
+            </p:nvGrpSpPr>
+            <p:grpSpPr>
+              <a:xfrm>
+                <a:off x="8530701" y="1550355"/>
+                <a:ext cx="997389" cy="814060"/>
+                <a:chOff x="8530701" y="1550355"/>
+                <a:chExt cx="997389" cy="814060"/>
+              </a:xfrm>
+            </p:grpSpPr>
+            <p:pic>
+              <p:nvPicPr>
+                <p:cNvPr id="7" name="Graphic 6">
+                  <a:extLst>
+                    <a:ext uri="{FF2B5EF4-FFF2-40B4-BE49-F238E27FC236}">
+                      <a16:creationId xmlns:a16="http://schemas.microsoft.com/office/drawing/2014/main" id="{68953AA4-91A2-4E46-9D69-1EE005C1751F}"/>
+                    </a:ext>
+                  </a:extLst>
+                </p:cNvPr>
+                <p:cNvPicPr>
+                  <a:picLocks noChangeAspect="1"/>
+                </p:cNvPicPr>
+                <p:nvPr/>
+              </p:nvPicPr>
+              <p:blipFill>
+                <a:blip r:embed="rId2">
+                  <a:extLst>
+                    <a:ext uri="{28A0092B-C50C-407E-A947-70E740481C1C}">
+                      <a14:useLocalDpi xmlns:a14="http://schemas.microsoft.com/office/drawing/2010/main" val="0"/>
+                    </a:ext>
+                    <a:ext uri="{96DAC541-7B7A-43D3-8B79-37D633B846F1}">
+                      <asvg:svgBlip xmlns:asvg="http://schemas.microsoft.com/office/drawing/2016/SVG/main" r:embed="rId3"/>
+                    </a:ext>
+                  </a:extLst>
+                </a:blip>
+                <a:stretch>
+                  <a:fillRect/>
+                </a:stretch>
+              </p:blipFill>
+              <p:spPr>
+                <a:xfrm>
+                  <a:off x="8753172" y="1550355"/>
+                  <a:ext cx="552450" cy="552450"/>
+                </a:xfrm>
+                <a:prstGeom prst="rect">
+                  <a:avLst/>
+                </a:prstGeom>
+              </p:spPr>
+            </p:pic>
+            <p:sp>
+              <p:nvSpPr>
+                <p:cNvPr id="8" name="TextBox 7">
+                  <a:extLst>
+                    <a:ext uri="{FF2B5EF4-FFF2-40B4-BE49-F238E27FC236}">
+                      <a16:creationId xmlns:a16="http://schemas.microsoft.com/office/drawing/2014/main" id="{A72B3E1A-B390-4012-9DA8-113AE975CCD7}"/>
+                    </a:ext>
+                  </a:extLst>
+                </p:cNvPr>
+                <p:cNvSpPr txBox="1"/>
+                <p:nvPr/>
+              </p:nvSpPr>
+              <p:spPr>
+                <a:xfrm>
+                  <a:off x="8530701" y="2102805"/>
+                  <a:ext cx="997389" cy="261610"/>
+                </a:xfrm>
+                <a:prstGeom prst="rect">
+                  <a:avLst/>
+                </a:prstGeom>
+                <a:noFill/>
+              </p:spPr>
+              <p:txBody>
+                <a:bodyPr wrap="none" rtlCol="0">
+                  <a:spAutoFit/>
+                </a:bodyPr>
+                <a:lstStyle/>
+                <a:p>
+                  <a:r>
+                    <a:rPr lang="en-US" sz="1100" dirty="0">
+                      <a:solidFill>
+                        <a:srgbClr val="E6EE9C"/>
+                      </a:solidFill>
+                      <a:latin typeface="Roboto" panose="02000000000000000000" pitchFamily="2" charset="0"/>
+                      <a:ea typeface="Roboto" panose="02000000000000000000" pitchFamily="2" charset="0"/>
+                    </a:rPr>
+                    <a:t>BUSINESSES</a:t>
+                  </a:r>
+                </a:p>
+              </p:txBody>
+            </p:sp>
+          </p:grpSp>
+          <p:sp>
+            <p:nvSpPr>
+              <p:cNvPr id="9" name="TextBox 8">
+                <a:extLst>
+                  <a:ext uri="{FF2B5EF4-FFF2-40B4-BE49-F238E27FC236}">
+                    <a16:creationId xmlns:a16="http://schemas.microsoft.com/office/drawing/2014/main" id="{0DFD7CFB-51C7-4EBB-B420-8D1813A848FE}"/>
+                  </a:ext>
+                </a:extLst>
+              </p:cNvPr>
+              <p:cNvSpPr txBox="1"/>
+              <p:nvPr/>
+            </p:nvSpPr>
+            <p:spPr>
+              <a:xfrm>
+                <a:off x="9789347" y="1588053"/>
+                <a:ext cx="1377300" cy="738664"/>
+              </a:xfrm>
+              <a:prstGeom prst="rect">
+                <a:avLst/>
+              </a:prstGeom>
+              <a:noFill/>
+            </p:spPr>
+            <p:txBody>
+              <a:bodyPr wrap="none" rtlCol="0">
+                <a:spAutoFit/>
+              </a:bodyPr>
+              <a:lstStyle/>
+              <a:p>
+                <a:r>
+                  <a:rPr lang="en-US" sz="1400" dirty="0">
+                    <a:solidFill>
+                      <a:schemeClr val="bg1"/>
+                    </a:solidFill>
+                    <a:latin typeface="Consolas" panose="020B0609020204030204" pitchFamily="49" charset="0"/>
+                  </a:rPr>
+                  <a:t>id</a:t>
+                </a:r>
+              </a:p>
+              <a:p>
+                <a:r>
+                  <a:rPr lang="en-US" sz="1400" dirty="0">
+                    <a:solidFill>
+                      <a:schemeClr val="bg1"/>
+                    </a:solidFill>
+                    <a:latin typeface="Consolas" panose="020B0609020204030204" pitchFamily="49" charset="0"/>
+                  </a:rPr>
+                  <a:t>name</a:t>
+                </a:r>
+              </a:p>
+              <a:p>
+                <a:r>
+                  <a:rPr lang="en-US" sz="1400" dirty="0">
+                    <a:solidFill>
+                      <a:schemeClr val="bg1"/>
+                    </a:solidFill>
+                    <a:latin typeface="Consolas" panose="020B0609020204030204" pitchFamily="49" charset="0"/>
+                  </a:rPr>
+                  <a:t>opening_days</a:t>
+                </a:r>
+              </a:p>
+            </p:txBody>
+          </p:sp>
+        </p:grpSp>
+        <p:grpSp>
+          <p:nvGrpSpPr>
+            <p:cNvPr id="56" name="Group 55">
+              <a:extLst>
+                <a:ext uri="{FF2B5EF4-FFF2-40B4-BE49-F238E27FC236}">
+                  <a16:creationId xmlns:a16="http://schemas.microsoft.com/office/drawing/2014/main" id="{EE058871-94EE-469A-9390-5EC1E0DD6337}"/>
+                </a:ext>
+              </a:extLst>
+            </p:cNvPr>
+            <p:cNvGrpSpPr/>
+            <p:nvPr/>
+          </p:nvGrpSpPr>
+          <p:grpSpPr>
+            <a:xfrm>
+              <a:off x="431800" y="2216604"/>
+              <a:ext cx="6116037" cy="369332"/>
+              <a:chOff x="431800" y="1772719"/>
+              <a:chExt cx="6116037" cy="369332"/>
+            </a:xfrm>
+          </p:grpSpPr>
+          <p:sp>
+            <p:nvSpPr>
+              <p:cNvPr id="3" name="TextBox 2">
+                <a:extLst>
+                  <a:ext uri="{FF2B5EF4-FFF2-40B4-BE49-F238E27FC236}">
+                    <a16:creationId xmlns:a16="http://schemas.microsoft.com/office/drawing/2014/main" id="{CD973CF3-71A1-4A46-857F-59F4CF19E511}"/>
+                  </a:ext>
+                </a:extLst>
+              </p:cNvPr>
+              <p:cNvSpPr txBox="1"/>
+              <p:nvPr/>
+            </p:nvSpPr>
+            <p:spPr>
+              <a:xfrm>
+                <a:off x="1492117" y="1772719"/>
+                <a:ext cx="5055720" cy="369332"/>
+              </a:xfrm>
+              <a:prstGeom prst="rect">
+                <a:avLst/>
+              </a:prstGeom>
+              <a:noFill/>
+            </p:spPr>
+            <p:txBody>
+              <a:bodyPr wrap="square" rtlCol="0">
+                <a:spAutoFit/>
+              </a:bodyPr>
+              <a:lstStyle/>
+              <a:p>
+                <a:r>
+                  <a:rPr lang="en-US" dirty="0">
+                    <a:solidFill>
+                      <a:schemeClr val="bg2">
+                        <a:lumMod val="50000"/>
+                      </a:schemeClr>
+                    </a:solidFill>
+                  </a:rPr>
+                  <a:t>https://mobile-project-****.twil.io</a:t>
+                </a:r>
+                <a:r>
+                  <a:rPr lang="en-US" dirty="0">
+                    <a:solidFill>
+                      <a:schemeClr val="bg1"/>
+                    </a:solidFill>
+                  </a:rPr>
+                  <a:t>/business/list</a:t>
+                </a:r>
+                <a:endParaRPr lang="it-IT" dirty="0">
+                  <a:solidFill>
+                    <a:schemeClr val="bg1"/>
+                  </a:solidFill>
+                </a:endParaRPr>
+              </a:p>
+            </p:txBody>
+          </p:sp>
+          <p:sp>
+            <p:nvSpPr>
+              <p:cNvPr id="40" name="Rectangle: Rounded Corners 39">
+                <a:extLst>
+                  <a:ext uri="{FF2B5EF4-FFF2-40B4-BE49-F238E27FC236}">
+                    <a16:creationId xmlns:a16="http://schemas.microsoft.com/office/drawing/2014/main" id="{DCA0AD21-1B79-4AF1-9F9D-B384A24BB992}"/>
+                  </a:ext>
+                </a:extLst>
+              </p:cNvPr>
+              <p:cNvSpPr/>
+              <p:nvPr/>
+            </p:nvSpPr>
+            <p:spPr>
+              <a:xfrm>
+                <a:off x="431800" y="1855469"/>
+                <a:ext cx="498405" cy="238760"/>
+              </a:xfrm>
+              <a:prstGeom prst="roundRect">
+                <a:avLst/>
+              </a:prstGeom>
+              <a:solidFill>
+                <a:srgbClr val="E6EE9C"/>
+              </a:solidFill>
+              <a:ln>
+                <a:noFill/>
+              </a:ln>
+            </p:spPr>
+            <p:style>
+              <a:lnRef idx="2">
+                <a:schemeClr val="accent1">
+                  <a:shade val="50000"/>
+                </a:schemeClr>
+              </a:lnRef>
+              <a:fillRef idx="1">
+                <a:schemeClr val="accent1"/>
+              </a:fillRef>
+              <a:effectRef idx="0">
+                <a:schemeClr val="accent1"/>
+              </a:effectRef>
+              <a:fontRef idx="minor">
+                <a:schemeClr val="lt1"/>
+              </a:fontRef>
+            </p:style>
+            <p:txBody>
+              <a:bodyPr rtlCol="0" anchor="ctr"/>
+              <a:lstStyle/>
+              <a:p>
+                <a:pPr algn="ctr"/>
+                <a:r>
+                  <a:rPr lang="en-US" sz="800" b="1" dirty="0">
+                    <a:solidFill>
+                      <a:srgbClr val="212121"/>
+                    </a:solidFill>
+                    <a:latin typeface="Roboto" panose="02000000000000000000" pitchFamily="2" charset="0"/>
+                    <a:ea typeface="Roboto" panose="02000000000000000000" pitchFamily="2" charset="0"/>
+                  </a:rPr>
+                  <a:t>GET</a:t>
+                </a:r>
+              </a:p>
+            </p:txBody>
+          </p:sp>
+        </p:grpSp>
+        <p:cxnSp>
+          <p:nvCxnSpPr>
+            <p:cNvPr id="68" name="Straight Arrow Connector 67">
+              <a:extLst>
+                <a:ext uri="{FF2B5EF4-FFF2-40B4-BE49-F238E27FC236}">
+                  <a16:creationId xmlns:a16="http://schemas.microsoft.com/office/drawing/2014/main" id="{05249BED-CB2F-4BDE-A6A4-669DF77006E4}"/>
+                </a:ext>
+              </a:extLst>
+            </p:cNvPr>
+            <p:cNvCxnSpPr>
+              <a:cxnSpLocks/>
+            </p:cNvCxnSpPr>
+            <p:nvPr/>
+          </p:nvCxnSpPr>
+          <p:spPr>
+            <a:xfrm flipH="1">
+              <a:off x="7446562" y="2401270"/>
+              <a:ext cx="720437" cy="0"/>
+            </a:xfrm>
+            <a:prstGeom prst="straightConnector1">
+              <a:avLst/>
+            </a:prstGeom>
+            <a:ln w="22225" cap="rnd">
+              <a:solidFill>
+                <a:schemeClr val="tx1">
+                  <a:lumMod val="65000"/>
+                  <a:lumOff val="35000"/>
+                </a:schemeClr>
+              </a:solidFill>
+              <a:round/>
+              <a:tailEnd type="triangle" w="lg" len="med"/>
+            </a:ln>
+          </p:spPr>
+          <p:style>
+            <a:lnRef idx="1">
+              <a:schemeClr val="accent1"/>
+            </a:lnRef>
+            <a:fillRef idx="0">
+              <a:schemeClr val="accent1"/>
+            </a:fillRef>
+            <a:effectRef idx="0">
+              <a:schemeClr val="accent1"/>
+            </a:effectRef>
+            <a:fontRef idx="minor">
+              <a:schemeClr val="tx1"/>
+            </a:fontRef>
+          </p:style>
+        </p:cxnSp>
+      </p:grpSp>
+    </p:spTree>
+    <p:extLst>
+      <p:ext uri="{BB962C8B-B14F-4D97-AF65-F5344CB8AC3E}">
+        <p14:creationId xmlns:p14="http://schemas.microsoft.com/office/powerpoint/2010/main" val="3759575066"/>
+      </p:ext>
+    </p:extLst>
+  </p:cSld>
+  <p:clrMapOvr>
+    <a:masterClrMapping/>
+  </p:clrMapOvr>
+  <p:timing>
+    <p:tnLst>
+      <p:par>
+        <p:cTn id="1" dur="indefinite" restart="never" nodeType="tmRoot">
+          <p:childTnLst>
+            <p:seq concurrent="1" nextAc="seek">
+              <p:cTn id="2" dur="indefinite" nodeType="mainSeq">
+                <p:childTnLst>
+                  <p:par>
+                    <p:cTn id="3" fill="hold">
+                      <p:stCondLst>
+                        <p:cond delay="indefinite"/>
+                      </p:stCondLst>
+                      <p:childTnLst>
+                        <p:par>
+                          <p:cTn id="4" fill="hold">
+                            <p:stCondLst>
+                              <p:cond delay="0"/>
+                            </p:stCondLst>
+                            <p:childTnLst>
+                              <p:par>
+                                <p:cTn id="5" presetID="1" presetClass="entr" presetSubtype="0" fill="hold" nodeType="clickEffect">
+                                  <p:stCondLst>
+                                    <p:cond delay="0"/>
+                                  </p:stCondLst>
+                                  <p:childTnLst>
+                                    <p:set>
+                                      <p:cBhvr>
+                                        <p:cTn id="6" dur="1" fill="hold">
+                                          <p:stCondLst>
+                                            <p:cond delay="0"/>
+                                          </p:stCondLst>
+                                        </p:cTn>
+                                        <p:tgtEl>
+                                          <p:spTgt spid="4"/>
+                                        </p:tgtEl>
+                                        <p:attrNameLst>
+                                          <p:attrName>style.visibility</p:attrName>
+                                        </p:attrNameLst>
+                                      </p:cBhvr>
+                                      <p:to>
+                                        <p:strVal val="visible"/>
+                                      </p:to>
+                                    </p:set>
+                                  </p:childTnLst>
+                                </p:cTn>
+                              </p:par>
+                            </p:childTnLst>
+                          </p:cTn>
+                        </p:par>
+                      </p:childTnLst>
+                    </p:cTn>
+                  </p:par>
+                </p:childTnLst>
+              </p:cTn>
+              <p:prevCondLst>
+                <p:cond evt="onPrev" delay="0">
+                  <p:tgtEl>
+                    <p:sldTgt/>
+                  </p:tgtEl>
+                </p:cond>
+              </p:prevCondLst>
+              <p:nextCondLst>
+                <p:cond evt="onNext" delay="0">
+                  <p:tgtEl>
+                    <p:sldTgt/>
+                  </p:tgtEl>
+                </p:cond>
+              </p:nextCondLst>
+            </p:seq>
+          </p:childTnLst>
+        </p:cTn>
+      </p:par>
+    </p:tnLst>
+  </p:timing>
+</p:sld>
+</file>
+
+<file path=ppt/slides/slide11.xml><?xml version="1.0" encoding="utf-8"?>
+<p:sld xmlns:a="http://schemas.openxmlformats.org/drawingml/2006/main" xmlns:r="http://schemas.openxmlformats.org/officeDocument/2006/relationships" xmlns:p="http://schemas.openxmlformats.org/presentationml/2006/main">
+  <p:cSld>
+    <p:bg>
+      <p:bgPr>
+        <a:solidFill>
+          <a:srgbClr val="212121"/>
+        </a:solidFill>
+        <a:effectLst/>
+      </p:bgPr>
+    </p:bg>
+    <p:spTree>
+      <p:nvGrpSpPr>
+        <p:cNvPr id="1" name=""/>
+        <p:cNvGrpSpPr/>
+        <p:nvPr/>
+      </p:nvGrpSpPr>
+      <p:grpSpPr>
+        <a:xfrm>
+          <a:off x="0" y="0"/>
+          <a:ext cx="0" cy="0"/>
+          <a:chOff x="0" y="0"/>
+          <a:chExt cx="0" cy="0"/>
+        </a:xfrm>
+      </p:grpSpPr>
+      <p:sp>
+        <p:nvSpPr>
+          <p:cNvPr id="2" name="Title 1">
+            <a:extLst>
+              <a:ext uri="{FF2B5EF4-FFF2-40B4-BE49-F238E27FC236}">
+                <a16:creationId xmlns:a16="http://schemas.microsoft.com/office/drawing/2014/main" id="{0715C0F7-3639-498A-876B-F3FE9A0EB105}"/>
+              </a:ext>
+            </a:extLst>
+          </p:cNvPr>
+          <p:cNvSpPr>
+            <a:spLocks noGrp="1"/>
+          </p:cNvSpPr>
+          <p:nvPr>
+            <p:ph type="title"/>
+          </p:nvPr>
+        </p:nvSpPr>
+        <p:spPr>
+          <a:xfrm>
+            <a:off x="431800" y="180398"/>
+            <a:ext cx="10515600" cy="1325563"/>
+          </a:xfrm>
+        </p:spPr>
+        <p:txBody>
+          <a:bodyPr>
+            <a:normAutofit/>
+          </a:bodyPr>
+          <a:lstStyle/>
+          <a:p>
+            <a:r>
+              <a:rPr lang="it-IT" sz="4000" dirty="0">
+                <a:solidFill>
+                  <a:schemeClr val="bg1">
+                    <a:lumMod val="95000"/>
+                  </a:schemeClr>
+                </a:solidFill>
+                <a:latin typeface="Roboto" panose="02000000000000000000" pitchFamily="2" charset="0"/>
+                <a:ea typeface="Roboto" panose="02000000000000000000" pitchFamily="2" charset="0"/>
+              </a:rPr>
+              <a:t>External API • </a:t>
+            </a:r>
+            <a:r>
+              <a:rPr lang="it-IT" sz="4000" dirty="0">
+                <a:solidFill>
+                  <a:srgbClr val="CAFFE7"/>
+                </a:solidFill>
+                <a:latin typeface="Roboto" panose="02000000000000000000" pitchFamily="2" charset="0"/>
+                <a:ea typeface="Roboto" panose="02000000000000000000" pitchFamily="2" charset="0"/>
+              </a:rPr>
               <a:t>MAPS</a:t>
             </a:r>
           </a:p>
@@ -4225,7 +4781,7 @@
 </p:sld>
 </file>
 
-<file path=ppt/slides/slide11.xml><?xml version="1.0" encoding="utf-8"?>
+<file path=ppt/slides/slide12.xml><?xml version="1.0" encoding="utf-8"?>
 <p:sld xmlns:a="http://schemas.openxmlformats.org/drawingml/2006/main" xmlns:r="http://schemas.openxmlformats.org/officeDocument/2006/relationships" xmlns:p="http://schemas.openxmlformats.org/presentationml/2006/main">
   <p:cSld>
     <p:bg>
@@ -4704,7 +5260,7 @@
         </p:nvGrpSpPr>
         <p:grpSpPr>
           <a:xfrm>
-            <a:off x="739848" y="5411107"/>
+            <a:off x="739845" y="5433094"/>
             <a:ext cx="1911459" cy="246221"/>
             <a:chOff x="739848" y="5406117"/>
             <a:chExt cx="1911459" cy="246221"/>
@@ -4794,10 +5350,10 @@
       </p:grpSp>
       <p:pic>
         <p:nvPicPr>
-          <p:cNvPr id="13" name="Picture 12">
-            <a:extLst>
-              <a:ext uri="{FF2B5EF4-FFF2-40B4-BE49-F238E27FC236}">
-                <a16:creationId xmlns:a16="http://schemas.microsoft.com/office/drawing/2014/main" id="{B78AD463-16F4-4394-9501-A7476937E60E}"/>
+          <p:cNvPr id="16" name="Picture 15">
+            <a:extLst>
+              <a:ext uri="{FF2B5EF4-FFF2-40B4-BE49-F238E27FC236}">
+                <a16:creationId xmlns:a16="http://schemas.microsoft.com/office/drawing/2014/main" id="{A0DA1D7B-E2C5-4522-8E50-0E7E5B93EC09}"/>
               </a:ext>
             </a:extLst>
           </p:cNvPr>
@@ -4820,8 +5376,8 @@
         </p:blipFill>
         <p:spPr>
           <a:xfrm>
-            <a:off x="4422670" y="5409927"/>
-            <a:ext cx="2187130" cy="259102"/>
+            <a:off x="8798096" y="5443207"/>
+            <a:ext cx="2027096" cy="220999"/>
           </a:xfrm>
           <a:prstGeom prst="rect">
             <a:avLst/>
@@ -4830,10 +5386,10 @@
       </p:pic>
       <p:pic>
         <p:nvPicPr>
-          <p:cNvPr id="22" name="Picture 21">
-            <a:extLst>
-              <a:ext uri="{FF2B5EF4-FFF2-40B4-BE49-F238E27FC236}">
-                <a16:creationId xmlns:a16="http://schemas.microsoft.com/office/drawing/2014/main" id="{4501AA8E-4CA7-40DE-B4DA-213D4B695765}"/>
+          <p:cNvPr id="24" name="Picture 23">
+            <a:extLst>
+              <a:ext uri="{FF2B5EF4-FFF2-40B4-BE49-F238E27FC236}">
+                <a16:creationId xmlns:a16="http://schemas.microsoft.com/office/drawing/2014/main" id="{381435AB-2881-4AAD-B736-D5F99900B5D8}"/>
               </a:ext>
             </a:extLst>
           </p:cNvPr>
@@ -4856,8 +5412,8 @@
         </p:blipFill>
         <p:spPr>
           <a:xfrm>
-            <a:off x="8790475" y="5416098"/>
-            <a:ext cx="2042337" cy="236240"/>
+            <a:off x="4407429" y="5427833"/>
+            <a:ext cx="2217612" cy="251482"/>
           </a:xfrm>
           <a:prstGeom prst="rect">
             <a:avLst/>
@@ -5088,7 +5644,7 @@
                                           </p:stCondLst>
                                         </p:cTn>
                                         <p:tgtEl>
-                                          <p:spTgt spid="13"/>
+                                          <p:spTgt spid="9"/>
                                         </p:tgtEl>
                                         <p:attrNameLst>
                                           <p:attrName>style.visibility</p:attrName>
@@ -5115,7 +5671,7 @@
                                           </p:stCondLst>
                                         </p:cTn>
                                         <p:tgtEl>
-                                          <p:spTgt spid="9"/>
+                                          <p:spTgt spid="24"/>
                                         </p:tgtEl>
                                         <p:attrNameLst>
                                           <p:attrName>style.visibility</p:attrName>
@@ -5241,7 +5797,7 @@
                                           </p:stCondLst>
                                         </p:cTn>
                                         <p:tgtEl>
-                                          <p:spTgt spid="22"/>
+                                          <p:spTgt spid="16"/>
                                         </p:tgtEl>
                                         <p:attrNameLst>
                                           <p:attrName>style.visibility</p:attrName>
@@ -5293,7 +5849,7 @@
 </p:sld>
 </file>
 
-<file path=ppt/slides/slide12.xml><?xml version="1.0" encoding="utf-8"?>
+<file path=ppt/slides/slide13.xml><?xml version="1.0" encoding="utf-8"?>
 <p:sld xmlns:a="http://schemas.openxmlformats.org/drawingml/2006/main" xmlns:r="http://schemas.openxmlformats.org/officeDocument/2006/relationships" xmlns:p="http://schemas.openxmlformats.org/presentationml/2006/main">
   <p:cSld>
     <p:bg>
@@ -6257,7 +6813,7 @@
 </p:sld>
 </file>
 
-<file path=ppt/slides/slide13.xml><?xml version="1.0" encoding="utf-8"?>
+<file path=ppt/slides/slide14.xml><?xml version="1.0" encoding="utf-8"?>
 <p:sld xmlns:a="http://schemas.openxmlformats.org/drawingml/2006/main" xmlns:r="http://schemas.openxmlformats.org/officeDocument/2006/relationships" xmlns:p="http://schemas.openxmlformats.org/presentationml/2006/main">
   <p:cSld>
     <p:bg>
@@ -6311,12 +6867,12 @@
           <a:lstStyle/>
           <a:p>
             <a:r>
-              <a:rPr lang="it-IT" b="1" dirty="0">
+              <a:rPr lang="it-IT" dirty="0">
                 <a:solidFill>
                   <a:schemeClr val="bg1"/>
                 </a:solidFill>
-                <a:latin typeface="Roboto Thin" panose="02000000000000000000" pitchFamily="2" charset="0"/>
-                <a:ea typeface="Roboto Thin" panose="02000000000000000000" pitchFamily="2" charset="0"/>
+                <a:latin typeface="Roboto Light" panose="02000000000000000000" pitchFamily="2" charset="0"/>
+                <a:ea typeface="Roboto Light" panose="02000000000000000000" pitchFamily="2" charset="0"/>
               </a:rPr>
               <a:t>THANKS</a:t>
             </a:r>
@@ -6554,8 +7110,8 @@
                 <a:solidFill>
                   <a:srgbClr val="CAFFE7"/>
                 </a:solidFill>
-                <a:latin typeface="Roboto Light" panose="02000000000000000000" pitchFamily="2" charset="0"/>
-                <a:ea typeface="Roboto Light" panose="02000000000000000000" pitchFamily="2" charset="0"/>
+                <a:latin typeface="Roboto" panose="02000000000000000000" pitchFamily="2" charset="0"/>
+                <a:ea typeface="Roboto" panose="02000000000000000000" pitchFamily="2" charset="0"/>
               </a:rPr>
               <a:t>crowded</a:t>
             </a:r>
@@ -6680,8 +7236,8 @@
                 <a:solidFill>
                   <a:srgbClr val="CAFFE7"/>
                 </a:solidFill>
-                <a:latin typeface="Roboto Light" panose="02000000000000000000" pitchFamily="2" charset="0"/>
-                <a:ea typeface="Roboto Light" panose="02000000000000000000" pitchFamily="2" charset="0"/>
+                <a:latin typeface="Roboto" panose="02000000000000000000" pitchFamily="2" charset="0"/>
+                <a:ea typeface="Roboto" panose="02000000000000000000" pitchFamily="2" charset="0"/>
               </a:rPr>
               <a:t>book</a:t>
             </a:r>
@@ -6891,6 +7447,66 @@
           </a:prstGeom>
         </p:spPr>
       </p:pic>
+      <p:sp>
+        <p:nvSpPr>
+          <p:cNvPr id="5" name="Rectangle: Rounded Corners 4">
+            <a:extLst>
+              <a:ext uri="{FF2B5EF4-FFF2-40B4-BE49-F238E27FC236}">
+                <a16:creationId xmlns:a16="http://schemas.microsoft.com/office/drawing/2014/main" id="{8A2025D8-BDDB-4EA8-80E1-F1D70B6D7F4B}"/>
+              </a:ext>
+            </a:extLst>
+          </p:cNvPr>
+          <p:cNvSpPr/>
+          <p:nvPr/>
+        </p:nvSpPr>
+        <p:spPr>
+          <a:xfrm>
+            <a:off x="9620263" y="6486702"/>
+            <a:ext cx="2512226" cy="307777"/>
+          </a:xfrm>
+          <a:prstGeom prst="roundRect">
+            <a:avLst/>
+          </a:prstGeom>
+          <a:solidFill>
+            <a:srgbClr val="E6EE9C"/>
+          </a:solidFill>
+          <a:ln>
+            <a:noFill/>
+          </a:ln>
+        </p:spPr>
+        <p:style>
+          <a:lnRef idx="2">
+            <a:schemeClr val="accent1">
+              <a:shade val="50000"/>
+            </a:schemeClr>
+          </a:lnRef>
+          <a:fillRef idx="1">
+            <a:schemeClr val="accent1"/>
+          </a:fillRef>
+          <a:effectRef idx="0">
+            <a:schemeClr val="accent1"/>
+          </a:effectRef>
+          <a:fontRef idx="minor">
+            <a:schemeClr val="lt1"/>
+          </a:fontRef>
+        </p:style>
+        <p:txBody>
+          <a:bodyPr rtlCol="0" anchor="ctr"/>
+          <a:lstStyle/>
+          <a:p>
+            <a:pPr algn="ctr"/>
+            <a:r>
+              <a:rPr lang="en-US" sz="1200" b="1" dirty="0">
+                <a:solidFill>
+                  <a:srgbClr val="212121"/>
+                </a:solidFill>
+                <a:latin typeface="Roboto "/>
+              </a:rPr>
+              <a:t>Sinergy with SW-ENG 2 course</a:t>
+            </a:r>
+          </a:p>
+        </p:txBody>
+      </p:sp>
     </p:spTree>
     <p:extLst>
       <p:ext uri="{BB962C8B-B14F-4D97-AF65-F5344CB8AC3E}">
@@ -7179,6 +7795,51 @@
                       </p:childTnLst>
                     </p:cTn>
                   </p:par>
+                  <p:par>
+                    <p:cTn id="25" fill="hold">
+                      <p:stCondLst>
+                        <p:cond delay="indefinite"/>
+                      </p:stCondLst>
+                      <p:childTnLst>
+                        <p:par>
+                          <p:cTn id="26" fill="hold">
+                            <p:stCondLst>
+                              <p:cond delay="0"/>
+                            </p:stCondLst>
+                            <p:childTnLst>
+                              <p:par>
+                                <p:cTn id="27" presetID="1" presetClass="entr" presetSubtype="0" fill="hold" grpId="0" nodeType="clickEffect">
+                                  <p:stCondLst>
+                                    <p:cond delay="0"/>
+                                  </p:stCondLst>
+                                  <p:childTnLst>
+                                    <p:set>
+                                      <p:cBhvr>
+                                        <p:cTn id="28" dur="1" fill="hold">
+                                          <p:stCondLst>
+                                            <p:cond delay="0"/>
+                                          </p:stCondLst>
+                                        </p:cTn>
+                                        <p:tgtEl>
+                                          <p:spTgt spid="5"/>
+                                        </p:tgtEl>
+                                        <p:attrNameLst>
+                                          <p:attrName>style.visibility</p:attrName>
+                                        </p:attrNameLst>
+                                      </p:cBhvr>
+                                      <p:to>
+                                        <p:strVal val="visible"/>
+                                      </p:to>
+                                    </p:set>
+                                  </p:childTnLst>
+                                </p:cTn>
+                              </p:par>
+                            </p:childTnLst>
+                          </p:cTn>
+                        </p:par>
+                      </p:childTnLst>
+                    </p:cTn>
+                  </p:par>
                 </p:childTnLst>
               </p:cTn>
               <p:prevCondLst>
@@ -7207,6 +7868,7 @@
       <p:bldP spid="27" grpId="0"/>
       <p:bldP spid="28" grpId="0"/>
       <p:bldP spid="29" grpId="0"/>
+      <p:bldP spid="5" grpId="0" animBg="1"/>
     </p:bldLst>
   </p:timing>
 </p:sld>
@@ -15919,10 +16581,10 @@
       </p:sp>
       <p:grpSp>
         <p:nvGrpSpPr>
-          <p:cNvPr id="80" name="Group 79">
-            <a:extLst>
-              <a:ext uri="{FF2B5EF4-FFF2-40B4-BE49-F238E27FC236}">
-                <a16:creationId xmlns:a16="http://schemas.microsoft.com/office/drawing/2014/main" id="{27B321D7-3101-434E-9EBB-2DD8C4F822D3}"/>
+          <p:cNvPr id="5" name="Group 4">
+            <a:extLst>
+              <a:ext uri="{FF2B5EF4-FFF2-40B4-BE49-F238E27FC236}">
+                <a16:creationId xmlns:a16="http://schemas.microsoft.com/office/drawing/2014/main" id="{179B7787-5FD2-417F-84DA-B0CBEC513747}"/>
               </a:ext>
             </a:extLst>
           </p:cNvPr>
@@ -15931,463 +16593,7 @@
         </p:nvGrpSpPr>
         <p:grpSpPr>
           <a:xfrm>
-            <a:off x="431800" y="1550355"/>
-            <a:ext cx="11269870" cy="814060"/>
-            <a:chOff x="431800" y="1550355"/>
-            <a:chExt cx="11269870" cy="814060"/>
-          </a:xfrm>
-        </p:grpSpPr>
-        <p:grpSp>
-          <p:nvGrpSpPr>
-            <p:cNvPr id="16" name="Group 15">
-              <a:extLst>
-                <a:ext uri="{FF2B5EF4-FFF2-40B4-BE49-F238E27FC236}">
-                  <a16:creationId xmlns:a16="http://schemas.microsoft.com/office/drawing/2014/main" id="{FA1F6881-9AF7-4DFE-ADF6-60487BBCFEA3}"/>
-                </a:ext>
-              </a:extLst>
-            </p:cNvPr>
-            <p:cNvGrpSpPr/>
-            <p:nvPr/>
-          </p:nvGrpSpPr>
-          <p:grpSpPr>
-            <a:xfrm>
-              <a:off x="9065724" y="1550355"/>
-              <a:ext cx="2635946" cy="814060"/>
-              <a:chOff x="8530701" y="1550355"/>
-              <a:chExt cx="2635946" cy="814060"/>
-            </a:xfrm>
-          </p:grpSpPr>
-          <p:grpSp>
-            <p:nvGrpSpPr>
-              <p:cNvPr id="11" name="Group 10">
-                <a:extLst>
-                  <a:ext uri="{FF2B5EF4-FFF2-40B4-BE49-F238E27FC236}">
-                    <a16:creationId xmlns:a16="http://schemas.microsoft.com/office/drawing/2014/main" id="{1007905C-9B7A-4D50-A361-63F15270ACEE}"/>
-                  </a:ext>
-                </a:extLst>
-              </p:cNvPr>
-              <p:cNvGrpSpPr/>
-              <p:nvPr/>
-            </p:nvGrpSpPr>
-            <p:grpSpPr>
-              <a:xfrm>
-                <a:off x="8530701" y="1550355"/>
-                <a:ext cx="997389" cy="814060"/>
-                <a:chOff x="8530701" y="1550355"/>
-                <a:chExt cx="997389" cy="814060"/>
-              </a:xfrm>
-            </p:grpSpPr>
-            <p:pic>
-              <p:nvPicPr>
-                <p:cNvPr id="7" name="Graphic 6">
-                  <a:extLst>
-                    <a:ext uri="{FF2B5EF4-FFF2-40B4-BE49-F238E27FC236}">
-                      <a16:creationId xmlns:a16="http://schemas.microsoft.com/office/drawing/2014/main" id="{68953AA4-91A2-4E46-9D69-1EE005C1751F}"/>
-                    </a:ext>
-                  </a:extLst>
-                </p:cNvPr>
-                <p:cNvPicPr>
-                  <a:picLocks noChangeAspect="1"/>
-                </p:cNvPicPr>
-                <p:nvPr/>
-              </p:nvPicPr>
-              <p:blipFill>
-                <a:blip r:embed="rId2">
-                  <a:extLst>
-                    <a:ext uri="{28A0092B-C50C-407E-A947-70E740481C1C}">
-                      <a14:useLocalDpi xmlns:a14="http://schemas.microsoft.com/office/drawing/2010/main" val="0"/>
-                    </a:ext>
-                    <a:ext uri="{96DAC541-7B7A-43D3-8B79-37D633B846F1}">
-                      <asvg:svgBlip xmlns:asvg="http://schemas.microsoft.com/office/drawing/2016/SVG/main" r:embed="rId3"/>
-                    </a:ext>
-                  </a:extLst>
-                </a:blip>
-                <a:stretch>
-                  <a:fillRect/>
-                </a:stretch>
-              </p:blipFill>
-              <p:spPr>
-                <a:xfrm>
-                  <a:off x="8753172" y="1550355"/>
-                  <a:ext cx="552450" cy="552450"/>
-                </a:xfrm>
-                <a:prstGeom prst="rect">
-                  <a:avLst/>
-                </a:prstGeom>
-              </p:spPr>
-            </p:pic>
-            <p:sp>
-              <p:nvSpPr>
-                <p:cNvPr id="8" name="TextBox 7">
-                  <a:extLst>
-                    <a:ext uri="{FF2B5EF4-FFF2-40B4-BE49-F238E27FC236}">
-                      <a16:creationId xmlns:a16="http://schemas.microsoft.com/office/drawing/2014/main" id="{A72B3E1A-B390-4012-9DA8-113AE975CCD7}"/>
-                    </a:ext>
-                  </a:extLst>
-                </p:cNvPr>
-                <p:cNvSpPr txBox="1"/>
-                <p:nvPr/>
-              </p:nvSpPr>
-              <p:spPr>
-                <a:xfrm>
-                  <a:off x="8530701" y="2102805"/>
-                  <a:ext cx="997389" cy="261610"/>
-                </a:xfrm>
-                <a:prstGeom prst="rect">
-                  <a:avLst/>
-                </a:prstGeom>
-                <a:noFill/>
-              </p:spPr>
-              <p:txBody>
-                <a:bodyPr wrap="none" rtlCol="0">
-                  <a:spAutoFit/>
-                </a:bodyPr>
-                <a:lstStyle/>
-                <a:p>
-                  <a:r>
-                    <a:rPr lang="en-US" sz="1100" dirty="0">
-                      <a:solidFill>
-                        <a:srgbClr val="E6EE9C"/>
-                      </a:solidFill>
-                      <a:latin typeface="Roboto" panose="02000000000000000000" pitchFamily="2" charset="0"/>
-                      <a:ea typeface="Roboto" panose="02000000000000000000" pitchFamily="2" charset="0"/>
-                    </a:rPr>
-                    <a:t>BUSINESSES</a:t>
-                  </a:r>
-                </a:p>
-              </p:txBody>
-            </p:sp>
-          </p:grpSp>
-          <p:sp>
-            <p:nvSpPr>
-              <p:cNvPr id="9" name="TextBox 8">
-                <a:extLst>
-                  <a:ext uri="{FF2B5EF4-FFF2-40B4-BE49-F238E27FC236}">
-                    <a16:creationId xmlns:a16="http://schemas.microsoft.com/office/drawing/2014/main" id="{0DFD7CFB-51C7-4EBB-B420-8D1813A848FE}"/>
-                  </a:ext>
-                </a:extLst>
-              </p:cNvPr>
-              <p:cNvSpPr txBox="1"/>
-              <p:nvPr/>
-            </p:nvSpPr>
-            <p:spPr>
-              <a:xfrm>
-                <a:off x="9789347" y="1588053"/>
-                <a:ext cx="1377300" cy="738664"/>
-              </a:xfrm>
-              <a:prstGeom prst="rect">
-                <a:avLst/>
-              </a:prstGeom>
-              <a:noFill/>
-            </p:spPr>
-            <p:txBody>
-              <a:bodyPr wrap="none" rtlCol="0">
-                <a:spAutoFit/>
-              </a:bodyPr>
-              <a:lstStyle/>
-              <a:p>
-                <a:r>
-                  <a:rPr lang="en-US" sz="1400" dirty="0">
-                    <a:solidFill>
-                      <a:schemeClr val="bg1"/>
-                    </a:solidFill>
-                    <a:latin typeface="Consolas" panose="020B0609020204030204" pitchFamily="49" charset="0"/>
-                  </a:rPr>
-                  <a:t>id</a:t>
-                </a:r>
-              </a:p>
-              <a:p>
-                <a:r>
-                  <a:rPr lang="en-US" sz="1400" dirty="0">
-                    <a:solidFill>
-                      <a:schemeClr val="bg1"/>
-                    </a:solidFill>
-                    <a:latin typeface="Consolas" panose="020B0609020204030204" pitchFamily="49" charset="0"/>
-                  </a:rPr>
-                  <a:t>name</a:t>
-                </a:r>
-              </a:p>
-              <a:p>
-                <a:r>
-                  <a:rPr lang="en-US" sz="1400" dirty="0">
-                    <a:solidFill>
-                      <a:schemeClr val="bg1"/>
-                    </a:solidFill>
-                    <a:latin typeface="Consolas" panose="020B0609020204030204" pitchFamily="49" charset="0"/>
-                  </a:rPr>
-                  <a:t>opening_days</a:t>
-                </a:r>
-              </a:p>
-            </p:txBody>
-          </p:sp>
-        </p:grpSp>
-        <p:grpSp>
-          <p:nvGrpSpPr>
-            <p:cNvPr id="56" name="Group 55">
-              <a:extLst>
-                <a:ext uri="{FF2B5EF4-FFF2-40B4-BE49-F238E27FC236}">
-                  <a16:creationId xmlns:a16="http://schemas.microsoft.com/office/drawing/2014/main" id="{EE058871-94EE-469A-9390-5EC1E0DD6337}"/>
-                </a:ext>
-              </a:extLst>
-            </p:cNvPr>
-            <p:cNvGrpSpPr/>
-            <p:nvPr/>
-          </p:nvGrpSpPr>
-          <p:grpSpPr>
-            <a:xfrm>
-              <a:off x="431800" y="1772719"/>
-              <a:ext cx="6116037" cy="369332"/>
-              <a:chOff x="431800" y="1772719"/>
-              <a:chExt cx="6116037" cy="369332"/>
-            </a:xfrm>
-          </p:grpSpPr>
-          <p:sp>
-            <p:nvSpPr>
-              <p:cNvPr id="3" name="TextBox 2">
-                <a:extLst>
-                  <a:ext uri="{FF2B5EF4-FFF2-40B4-BE49-F238E27FC236}">
-                    <a16:creationId xmlns:a16="http://schemas.microsoft.com/office/drawing/2014/main" id="{CD973CF3-71A1-4A46-857F-59F4CF19E511}"/>
-                  </a:ext>
-                </a:extLst>
-              </p:cNvPr>
-              <p:cNvSpPr txBox="1"/>
-              <p:nvPr/>
-            </p:nvSpPr>
-            <p:spPr>
-              <a:xfrm>
-                <a:off x="1492117" y="1772719"/>
-                <a:ext cx="5055720" cy="369332"/>
-              </a:xfrm>
-              <a:prstGeom prst="rect">
-                <a:avLst/>
-              </a:prstGeom>
-              <a:noFill/>
-            </p:spPr>
-            <p:txBody>
-              <a:bodyPr wrap="square" rtlCol="0">
-                <a:spAutoFit/>
-              </a:bodyPr>
-              <a:lstStyle/>
-              <a:p>
-                <a:r>
-                  <a:rPr lang="en-US" dirty="0">
-                    <a:solidFill>
-                      <a:schemeClr val="bg2">
-                        <a:lumMod val="50000"/>
-                      </a:schemeClr>
-                    </a:solidFill>
-                  </a:rPr>
-                  <a:t>https://mobile-project-****.twil.io</a:t>
-                </a:r>
-                <a:r>
-                  <a:rPr lang="en-US" dirty="0">
-                    <a:solidFill>
-                      <a:schemeClr val="bg1"/>
-                    </a:solidFill>
-                  </a:rPr>
-                  <a:t>/business/list</a:t>
-                </a:r>
-                <a:endParaRPr lang="it-IT" dirty="0">
-                  <a:solidFill>
-                    <a:schemeClr val="bg1"/>
-                  </a:solidFill>
-                </a:endParaRPr>
-              </a:p>
-            </p:txBody>
-          </p:sp>
-          <p:sp>
-            <p:nvSpPr>
-              <p:cNvPr id="40" name="Rectangle: Rounded Corners 39">
-                <a:extLst>
-                  <a:ext uri="{FF2B5EF4-FFF2-40B4-BE49-F238E27FC236}">
-                    <a16:creationId xmlns:a16="http://schemas.microsoft.com/office/drawing/2014/main" id="{DCA0AD21-1B79-4AF1-9F9D-B384A24BB992}"/>
-                  </a:ext>
-                </a:extLst>
-              </p:cNvPr>
-              <p:cNvSpPr/>
-              <p:nvPr/>
-            </p:nvSpPr>
-            <p:spPr>
-              <a:xfrm>
-                <a:off x="431800" y="1855469"/>
-                <a:ext cx="498405" cy="238760"/>
-              </a:xfrm>
-              <a:prstGeom prst="roundRect">
-                <a:avLst/>
-              </a:prstGeom>
-              <a:solidFill>
-                <a:srgbClr val="E6EE9C"/>
-              </a:solidFill>
-              <a:ln>
-                <a:noFill/>
-              </a:ln>
-            </p:spPr>
-            <p:style>
-              <a:lnRef idx="2">
-                <a:schemeClr val="accent1">
-                  <a:shade val="50000"/>
-                </a:schemeClr>
-              </a:lnRef>
-              <a:fillRef idx="1">
-                <a:schemeClr val="accent1"/>
-              </a:fillRef>
-              <a:effectRef idx="0">
-                <a:schemeClr val="accent1"/>
-              </a:effectRef>
-              <a:fontRef idx="minor">
-                <a:schemeClr val="lt1"/>
-              </a:fontRef>
-            </p:style>
-            <p:txBody>
-              <a:bodyPr rtlCol="0" anchor="ctr"/>
-              <a:lstStyle/>
-              <a:p>
-                <a:pPr algn="ctr"/>
-                <a:r>
-                  <a:rPr lang="en-US" sz="800" b="1" dirty="0">
-                    <a:solidFill>
-                      <a:srgbClr val="212121"/>
-                    </a:solidFill>
-                    <a:latin typeface="Roboto" panose="02000000000000000000" pitchFamily="2" charset="0"/>
-                    <a:ea typeface="Roboto" panose="02000000000000000000" pitchFamily="2" charset="0"/>
-                  </a:rPr>
-                  <a:t>GET</a:t>
-                </a:r>
-              </a:p>
-            </p:txBody>
-          </p:sp>
-        </p:grpSp>
-        <p:grpSp>
-          <p:nvGrpSpPr>
-            <p:cNvPr id="69" name="Group 68">
-              <a:extLst>
-                <a:ext uri="{FF2B5EF4-FFF2-40B4-BE49-F238E27FC236}">
-                  <a16:creationId xmlns:a16="http://schemas.microsoft.com/office/drawing/2014/main" id="{0FCF8835-CC90-4ED3-9651-06A5315156CB}"/>
-                </a:ext>
-              </a:extLst>
-            </p:cNvPr>
-            <p:cNvGrpSpPr/>
-            <p:nvPr/>
-          </p:nvGrpSpPr>
-          <p:grpSpPr>
-            <a:xfrm>
-              <a:off x="7446562" y="1888505"/>
-              <a:ext cx="720437" cy="137760"/>
-              <a:chOff x="7047345" y="2004291"/>
-              <a:chExt cx="720437" cy="137760"/>
-            </a:xfrm>
-          </p:grpSpPr>
-          <p:cxnSp>
-            <p:nvCxnSpPr>
-              <p:cNvPr id="67" name="Straight Arrow Connector 66">
-                <a:extLst>
-                  <a:ext uri="{FF2B5EF4-FFF2-40B4-BE49-F238E27FC236}">
-                    <a16:creationId xmlns:a16="http://schemas.microsoft.com/office/drawing/2014/main" id="{08FB52E5-2067-4038-87F7-81F9775F058A}"/>
-                  </a:ext>
-                </a:extLst>
-              </p:cNvPr>
-              <p:cNvCxnSpPr/>
-              <p:nvPr/>
-            </p:nvCxnSpPr>
-            <p:spPr>
-              <a:xfrm>
-                <a:off x="7047345" y="2004291"/>
-                <a:ext cx="720437" cy="0"/>
-              </a:xfrm>
-              <a:prstGeom prst="straightConnector1">
-                <a:avLst/>
-              </a:prstGeom>
-              <a:ln w="22225" cap="rnd">
-                <a:solidFill>
-                  <a:schemeClr val="tx1">
-                    <a:lumMod val="65000"/>
-                    <a:lumOff val="35000"/>
-                  </a:schemeClr>
-                </a:solidFill>
-                <a:round/>
-                <a:tailEnd type="triangle" w="lg" len="med"/>
-              </a:ln>
-            </p:spPr>
-            <p:style>
-              <a:lnRef idx="1">
-                <a:schemeClr val="accent1"/>
-              </a:lnRef>
-              <a:fillRef idx="0">
-                <a:schemeClr val="accent1"/>
-              </a:fillRef>
-              <a:effectRef idx="0">
-                <a:schemeClr val="accent1"/>
-              </a:effectRef>
-              <a:fontRef idx="minor">
-                <a:schemeClr val="tx1"/>
-              </a:fontRef>
-            </p:style>
-          </p:cxnSp>
-          <p:cxnSp>
-            <p:nvCxnSpPr>
-              <p:cNvPr id="68" name="Straight Arrow Connector 67">
-                <a:extLst>
-                  <a:ext uri="{FF2B5EF4-FFF2-40B4-BE49-F238E27FC236}">
-                    <a16:creationId xmlns:a16="http://schemas.microsoft.com/office/drawing/2014/main" id="{05249BED-CB2F-4BDE-A6A4-669DF77006E4}"/>
-                  </a:ext>
-                </a:extLst>
-              </p:cNvPr>
-              <p:cNvCxnSpPr>
-                <a:cxnSpLocks/>
-              </p:cNvCxnSpPr>
-              <p:nvPr/>
-            </p:nvCxnSpPr>
-            <p:spPr>
-              <a:xfrm flipH="1">
-                <a:off x="7047345" y="2142051"/>
-                <a:ext cx="720437" cy="0"/>
-              </a:xfrm>
-              <a:prstGeom prst="straightConnector1">
-                <a:avLst/>
-              </a:prstGeom>
-              <a:ln w="22225" cap="rnd">
-                <a:solidFill>
-                  <a:schemeClr val="tx1">
-                    <a:lumMod val="65000"/>
-                    <a:lumOff val="35000"/>
-                  </a:schemeClr>
-                </a:solidFill>
-                <a:round/>
-                <a:tailEnd type="triangle" w="lg" len="med"/>
-              </a:ln>
-            </p:spPr>
-            <p:style>
-              <a:lnRef idx="1">
-                <a:schemeClr val="accent1"/>
-              </a:lnRef>
-              <a:fillRef idx="0">
-                <a:schemeClr val="accent1"/>
-              </a:fillRef>
-              <a:effectRef idx="0">
-                <a:schemeClr val="accent1"/>
-              </a:effectRef>
-              <a:fontRef idx="minor">
-                <a:schemeClr val="tx1"/>
-              </a:fontRef>
-            </p:style>
-          </p:cxnSp>
-        </p:grpSp>
-      </p:grpSp>
-      <p:grpSp>
-        <p:nvGrpSpPr>
-          <p:cNvPr id="81" name="Group 80">
-            <a:extLst>
-              <a:ext uri="{FF2B5EF4-FFF2-40B4-BE49-F238E27FC236}">
-                <a16:creationId xmlns:a16="http://schemas.microsoft.com/office/drawing/2014/main" id="{44D49F12-C1CE-4EB9-B13E-3B9EACF30793}"/>
-              </a:ext>
-            </a:extLst>
-          </p:cNvPr>
-          <p:cNvGrpSpPr/>
-          <p:nvPr/>
-        </p:nvGrpSpPr>
-        <p:grpSpPr>
-          <a:xfrm>
-            <a:off x="431800" y="3266658"/>
+            <a:off x="431800" y="1393460"/>
             <a:ext cx="11167919" cy="814060"/>
             <a:chOff x="431800" y="3266658"/>
             <a:chExt cx="11167919" cy="814060"/>
@@ -16716,128 +16922,61 @@
             </p:txBody>
           </p:sp>
         </p:grpSp>
-        <p:grpSp>
-          <p:nvGrpSpPr>
-            <p:cNvPr id="74" name="Group 73">
+        <p:cxnSp>
+          <p:nvCxnSpPr>
+            <p:cNvPr id="76" name="Straight Arrow Connector 75">
               <a:extLst>
                 <a:ext uri="{FF2B5EF4-FFF2-40B4-BE49-F238E27FC236}">
-                  <a16:creationId xmlns:a16="http://schemas.microsoft.com/office/drawing/2014/main" id="{C1E3E3AD-B40D-44FD-8596-BD843236450E}"/>
+                  <a16:creationId xmlns:a16="http://schemas.microsoft.com/office/drawing/2014/main" id="{D392CC8B-C40B-4ADF-ABBB-BC7C9751097F}"/>
                 </a:ext>
               </a:extLst>
             </p:cNvPr>
-            <p:cNvGrpSpPr/>
+            <p:cNvCxnSpPr>
+              <a:cxnSpLocks/>
+            </p:cNvCxnSpPr>
             <p:nvPr/>
-          </p:nvGrpSpPr>
-          <p:grpSpPr>
-            <a:xfrm>
-              <a:off x="7446561" y="3604808"/>
-              <a:ext cx="720437" cy="137760"/>
-              <a:chOff x="7047345" y="2004291"/>
-              <a:chExt cx="720437" cy="137760"/>
+          </p:nvCxnSpPr>
+          <p:spPr>
+            <a:xfrm flipH="1">
+              <a:off x="7446561" y="3673688"/>
+              <a:ext cx="720437" cy="0"/>
             </a:xfrm>
-          </p:grpSpPr>
-          <p:cxnSp>
-            <p:nvCxnSpPr>
-              <p:cNvPr id="75" name="Straight Arrow Connector 74">
-                <a:extLst>
-                  <a:ext uri="{FF2B5EF4-FFF2-40B4-BE49-F238E27FC236}">
-                    <a16:creationId xmlns:a16="http://schemas.microsoft.com/office/drawing/2014/main" id="{41EFA078-C4F2-4277-A5D1-E8EA504E37CB}"/>
-                  </a:ext>
-                </a:extLst>
-              </p:cNvPr>
-              <p:cNvCxnSpPr/>
-              <p:nvPr/>
-            </p:nvCxnSpPr>
-            <p:spPr>
-              <a:xfrm>
-                <a:off x="7047345" y="2004291"/>
-                <a:ext cx="720437" cy="0"/>
-              </a:xfrm>
-              <a:prstGeom prst="straightConnector1">
-                <a:avLst/>
-              </a:prstGeom>
-              <a:ln w="22225" cap="rnd">
-                <a:solidFill>
-                  <a:schemeClr val="tx1">
-                    <a:lumMod val="65000"/>
-                    <a:lumOff val="35000"/>
-                  </a:schemeClr>
-                </a:solidFill>
-                <a:round/>
-                <a:tailEnd type="triangle" w="lg" len="med"/>
-              </a:ln>
-            </p:spPr>
-            <p:style>
-              <a:lnRef idx="1">
-                <a:schemeClr val="accent1"/>
-              </a:lnRef>
-              <a:fillRef idx="0">
-                <a:schemeClr val="accent1"/>
-              </a:fillRef>
-              <a:effectRef idx="0">
-                <a:schemeClr val="accent1"/>
-              </a:effectRef>
-              <a:fontRef idx="minor">
-                <a:schemeClr val="tx1"/>
-              </a:fontRef>
-            </p:style>
-          </p:cxnSp>
-          <p:cxnSp>
-            <p:nvCxnSpPr>
-              <p:cNvPr id="76" name="Straight Arrow Connector 75">
-                <a:extLst>
-                  <a:ext uri="{FF2B5EF4-FFF2-40B4-BE49-F238E27FC236}">
-                    <a16:creationId xmlns:a16="http://schemas.microsoft.com/office/drawing/2014/main" id="{D392CC8B-C40B-4ADF-ABBB-BC7C9751097F}"/>
-                  </a:ext>
-                </a:extLst>
-              </p:cNvPr>
-              <p:cNvCxnSpPr>
-                <a:cxnSpLocks/>
-              </p:cNvCxnSpPr>
-              <p:nvPr/>
-            </p:nvCxnSpPr>
-            <p:spPr>
-              <a:xfrm flipH="1">
-                <a:off x="7047345" y="2142051"/>
-                <a:ext cx="720437" cy="0"/>
-              </a:xfrm>
-              <a:prstGeom prst="straightConnector1">
-                <a:avLst/>
-              </a:prstGeom>
-              <a:ln w="22225" cap="rnd">
-                <a:solidFill>
-                  <a:schemeClr val="tx1">
-                    <a:lumMod val="65000"/>
-                    <a:lumOff val="35000"/>
-                  </a:schemeClr>
-                </a:solidFill>
-                <a:round/>
-                <a:tailEnd type="triangle" w="lg" len="med"/>
-              </a:ln>
-            </p:spPr>
-            <p:style>
-              <a:lnRef idx="1">
-                <a:schemeClr val="accent1"/>
-              </a:lnRef>
-              <a:fillRef idx="0">
-                <a:schemeClr val="accent1"/>
-              </a:fillRef>
-              <a:effectRef idx="0">
-                <a:schemeClr val="accent1"/>
-              </a:effectRef>
-              <a:fontRef idx="minor">
-                <a:schemeClr val="tx1"/>
-              </a:fontRef>
-            </p:style>
-          </p:cxnSp>
-        </p:grpSp>
+            <a:prstGeom prst="straightConnector1">
+              <a:avLst/>
+            </a:prstGeom>
+            <a:ln w="22225" cap="rnd">
+              <a:solidFill>
+                <a:schemeClr val="tx1">
+                  <a:lumMod val="65000"/>
+                  <a:lumOff val="35000"/>
+                </a:schemeClr>
+              </a:solidFill>
+              <a:round/>
+              <a:tailEnd type="triangle" w="lg" len="med"/>
+            </a:ln>
+          </p:spPr>
+          <p:style>
+            <a:lnRef idx="1">
+              <a:schemeClr val="accent1"/>
+            </a:lnRef>
+            <a:fillRef idx="0">
+              <a:schemeClr val="accent1"/>
+            </a:fillRef>
+            <a:effectRef idx="0">
+              <a:schemeClr val="accent1"/>
+            </a:effectRef>
+            <a:fontRef idx="minor">
+              <a:schemeClr val="tx1"/>
+            </a:fontRef>
+          </p:style>
+        </p:cxnSp>
       </p:grpSp>
       <p:grpSp>
         <p:nvGrpSpPr>
-          <p:cNvPr id="82" name="Group 81">
-            <a:extLst>
-              <a:ext uri="{FF2B5EF4-FFF2-40B4-BE49-F238E27FC236}">
-                <a16:creationId xmlns:a16="http://schemas.microsoft.com/office/drawing/2014/main" id="{9B3304DF-D523-40B0-9F6C-A37DD488DC19}"/>
+          <p:cNvPr id="17" name="Group 16">
+            <a:extLst>
+              <a:ext uri="{FF2B5EF4-FFF2-40B4-BE49-F238E27FC236}">
+                <a16:creationId xmlns:a16="http://schemas.microsoft.com/office/drawing/2014/main" id="{F5D8A90F-5CE6-49ED-B470-777C5CF23A5A}"/>
               </a:ext>
             </a:extLst>
           </p:cNvPr>
@@ -16846,7 +16985,7 @@
         </p:nvGrpSpPr>
         <p:grpSpPr>
           <a:xfrm>
-            <a:off x="431800" y="4982962"/>
+            <a:off x="431800" y="2894892"/>
             <a:ext cx="10472216" cy="1768167"/>
             <a:chOff x="431800" y="4982962"/>
             <a:chExt cx="10472216" cy="1768167"/>
@@ -17468,6 +17607,414 @@
           </p:cxnSp>
         </p:grpSp>
       </p:grpSp>
+      <p:grpSp>
+        <p:nvGrpSpPr>
+          <p:cNvPr id="26" name="Group 25">
+            <a:extLst>
+              <a:ext uri="{FF2B5EF4-FFF2-40B4-BE49-F238E27FC236}">
+                <a16:creationId xmlns:a16="http://schemas.microsoft.com/office/drawing/2014/main" id="{5ABFB968-D660-465B-9D34-608CD260E523}"/>
+              </a:ext>
+            </a:extLst>
+          </p:cNvPr>
+          <p:cNvGrpSpPr/>
+          <p:nvPr/>
+        </p:nvGrpSpPr>
+        <p:grpSpPr>
+          <a:xfrm>
+            <a:off x="431800" y="5215002"/>
+            <a:ext cx="10214133" cy="1538476"/>
+            <a:chOff x="431800" y="5215002"/>
+            <a:chExt cx="10214133" cy="1538476"/>
+          </a:xfrm>
+        </p:grpSpPr>
+        <p:grpSp>
+          <p:nvGrpSpPr>
+            <p:cNvPr id="55" name="Group 54">
+              <a:extLst>
+                <a:ext uri="{FF2B5EF4-FFF2-40B4-BE49-F238E27FC236}">
+                  <a16:creationId xmlns:a16="http://schemas.microsoft.com/office/drawing/2014/main" id="{785D62AE-8930-4593-B561-49AF52B93CE2}"/>
+                </a:ext>
+              </a:extLst>
+            </p:cNvPr>
+            <p:cNvGrpSpPr/>
+            <p:nvPr/>
+          </p:nvGrpSpPr>
+          <p:grpSpPr>
+            <a:xfrm>
+              <a:off x="3674408" y="5939418"/>
+              <a:ext cx="1633011" cy="814060"/>
+              <a:chOff x="3674408" y="2361705"/>
+              <a:chExt cx="1633011" cy="814060"/>
+            </a:xfrm>
+          </p:grpSpPr>
+          <p:grpSp>
+            <p:nvGrpSpPr>
+              <p:cNvPr id="62" name="Group 61">
+                <a:extLst>
+                  <a:ext uri="{FF2B5EF4-FFF2-40B4-BE49-F238E27FC236}">
+                    <a16:creationId xmlns:a16="http://schemas.microsoft.com/office/drawing/2014/main" id="{43217540-6D68-4AD7-9CF1-854ABE1A05DE}"/>
+                  </a:ext>
+                </a:extLst>
+              </p:cNvPr>
+              <p:cNvGrpSpPr/>
+              <p:nvPr/>
+            </p:nvGrpSpPr>
+            <p:grpSpPr>
+              <a:xfrm>
+                <a:off x="3674408" y="2361705"/>
+                <a:ext cx="704039" cy="814060"/>
+                <a:chOff x="3674408" y="2361705"/>
+                <a:chExt cx="704039" cy="814060"/>
+              </a:xfrm>
+            </p:grpSpPr>
+            <p:pic>
+              <p:nvPicPr>
+                <p:cNvPr id="65" name="Graphic 64">
+                  <a:extLst>
+                    <a:ext uri="{FF2B5EF4-FFF2-40B4-BE49-F238E27FC236}">
+                      <a16:creationId xmlns:a16="http://schemas.microsoft.com/office/drawing/2014/main" id="{4061F905-1867-4712-B526-EDE2702C8F21}"/>
+                    </a:ext>
+                  </a:extLst>
+                </p:cNvPr>
+                <p:cNvPicPr>
+                  <a:picLocks noChangeAspect="1"/>
+                </p:cNvPicPr>
+                <p:nvPr/>
+              </p:nvPicPr>
+              <p:blipFill>
+                <a:blip r:embed="rId2">
+                  <a:extLst>
+                    <a:ext uri="{28A0092B-C50C-407E-A947-70E740481C1C}">
+                      <a14:useLocalDpi xmlns:a14="http://schemas.microsoft.com/office/drawing/2010/main" val="0"/>
+                    </a:ext>
+                    <a:ext uri="{96DAC541-7B7A-43D3-8B79-37D633B846F1}">
+                      <asvg:svgBlip xmlns:asvg="http://schemas.microsoft.com/office/drawing/2016/SVG/main" r:embed="rId3"/>
+                    </a:ext>
+                  </a:extLst>
+                </a:blip>
+                <a:stretch>
+                  <a:fillRect/>
+                </a:stretch>
+              </p:blipFill>
+              <p:spPr>
+                <a:xfrm>
+                  <a:off x="3750202" y="2361705"/>
+                  <a:ext cx="552450" cy="552450"/>
+                </a:xfrm>
+                <a:prstGeom prst="rect">
+                  <a:avLst/>
+                </a:prstGeom>
+              </p:spPr>
+            </p:pic>
+            <p:sp>
+              <p:nvSpPr>
+                <p:cNvPr id="66" name="TextBox 65">
+                  <a:extLst>
+                    <a:ext uri="{FF2B5EF4-FFF2-40B4-BE49-F238E27FC236}">
+                      <a16:creationId xmlns:a16="http://schemas.microsoft.com/office/drawing/2014/main" id="{4696C771-6EB3-4C9E-B2AA-D1B09E016839}"/>
+                    </a:ext>
+                  </a:extLst>
+                </p:cNvPr>
+                <p:cNvSpPr txBox="1"/>
+                <p:nvPr/>
+              </p:nvSpPr>
+              <p:spPr>
+                <a:xfrm>
+                  <a:off x="3674408" y="2914155"/>
+                  <a:ext cx="704039" cy="261610"/>
+                </a:xfrm>
+                <a:prstGeom prst="rect">
+                  <a:avLst/>
+                </a:prstGeom>
+                <a:noFill/>
+              </p:spPr>
+              <p:txBody>
+                <a:bodyPr wrap="none" rtlCol="0">
+                  <a:spAutoFit/>
+                </a:bodyPr>
+                <a:lstStyle/>
+                <a:p>
+                  <a:r>
+                    <a:rPr lang="en-US" sz="1100" dirty="0">
+                      <a:solidFill>
+                        <a:srgbClr val="E6EE9C"/>
+                      </a:solidFill>
+                      <a:latin typeface="Roboto" panose="02000000000000000000" pitchFamily="2" charset="0"/>
+                      <a:ea typeface="Roboto" panose="02000000000000000000" pitchFamily="2" charset="0"/>
+                    </a:rPr>
+                    <a:t>STATUS</a:t>
+                  </a:r>
+                </a:p>
+              </p:txBody>
+            </p:sp>
+          </p:grpSp>
+          <p:sp>
+            <p:nvSpPr>
+              <p:cNvPr id="63" name="TextBox 62">
+                <a:extLst>
+                  <a:ext uri="{FF2B5EF4-FFF2-40B4-BE49-F238E27FC236}">
+                    <a16:creationId xmlns:a16="http://schemas.microsoft.com/office/drawing/2014/main" id="{45D8C350-62DB-4918-AFA0-9CE5BE5472CE}"/>
+                  </a:ext>
+                </a:extLst>
+              </p:cNvPr>
+              <p:cNvSpPr txBox="1"/>
+              <p:nvPr/>
+            </p:nvSpPr>
+            <p:spPr>
+              <a:xfrm>
+                <a:off x="4725208" y="2614847"/>
+                <a:ext cx="582211" cy="307777"/>
+              </a:xfrm>
+              <a:prstGeom prst="rect">
+                <a:avLst/>
+              </a:prstGeom>
+              <a:noFill/>
+            </p:spPr>
+            <p:txBody>
+              <a:bodyPr wrap="none" rtlCol="0">
+                <a:spAutoFit/>
+              </a:bodyPr>
+              <a:lstStyle/>
+              <a:p>
+                <a:r>
+                  <a:rPr lang="en-US" sz="1400" dirty="0">
+                    <a:solidFill>
+                      <a:schemeClr val="bg1"/>
+                    </a:solidFill>
+                    <a:latin typeface="Consolas" panose="020B0609020204030204" pitchFamily="49" charset="0"/>
+                  </a:rPr>
+                  <a:t>uuid</a:t>
+                </a:r>
+              </a:p>
+            </p:txBody>
+          </p:sp>
+        </p:grpSp>
+        <p:grpSp>
+          <p:nvGrpSpPr>
+            <p:cNvPr id="57" name="Group 56">
+              <a:extLst>
+                <a:ext uri="{FF2B5EF4-FFF2-40B4-BE49-F238E27FC236}">
+                  <a16:creationId xmlns:a16="http://schemas.microsoft.com/office/drawing/2014/main" id="{E46AEBF1-03DC-4D5A-B9C4-8D29B31D0953}"/>
+                </a:ext>
+              </a:extLst>
+            </p:cNvPr>
+            <p:cNvGrpSpPr/>
+            <p:nvPr/>
+          </p:nvGrpSpPr>
+          <p:grpSpPr>
+            <a:xfrm>
+              <a:off x="431800" y="5350432"/>
+              <a:ext cx="6116037" cy="369332"/>
+              <a:chOff x="431800" y="1772719"/>
+              <a:chExt cx="6116037" cy="369332"/>
+            </a:xfrm>
+          </p:grpSpPr>
+          <p:sp>
+            <p:nvSpPr>
+              <p:cNvPr id="60" name="TextBox 59">
+                <a:extLst>
+                  <a:ext uri="{FF2B5EF4-FFF2-40B4-BE49-F238E27FC236}">
+                    <a16:creationId xmlns:a16="http://schemas.microsoft.com/office/drawing/2014/main" id="{756FE22D-E4CC-4AAD-9C02-36E6A4931AF4}"/>
+                  </a:ext>
+                </a:extLst>
+              </p:cNvPr>
+              <p:cNvSpPr txBox="1"/>
+              <p:nvPr/>
+            </p:nvSpPr>
+            <p:spPr>
+              <a:xfrm>
+                <a:off x="1492117" y="1772719"/>
+                <a:ext cx="5055720" cy="369332"/>
+              </a:xfrm>
+              <a:prstGeom prst="rect">
+                <a:avLst/>
+              </a:prstGeom>
+              <a:noFill/>
+            </p:spPr>
+            <p:txBody>
+              <a:bodyPr wrap="square" rtlCol="0">
+                <a:spAutoFit/>
+              </a:bodyPr>
+              <a:lstStyle/>
+              <a:p>
+                <a:r>
+                  <a:rPr lang="en-US" dirty="0">
+                    <a:solidFill>
+                      <a:schemeClr val="bg2">
+                        <a:lumMod val="50000"/>
+                      </a:schemeClr>
+                    </a:solidFill>
+                  </a:rPr>
+                  <a:t>https://mobile-project-****.twil.io</a:t>
+                </a:r>
+                <a:r>
+                  <a:rPr lang="en-US" dirty="0">
+                    <a:solidFill>
+                      <a:schemeClr val="bg1"/>
+                    </a:solidFill>
+                  </a:rPr>
+                  <a:t>/queue/update</a:t>
+                </a:r>
+                <a:endParaRPr lang="it-IT" dirty="0">
+                  <a:solidFill>
+                    <a:schemeClr val="bg1"/>
+                  </a:solidFill>
+                </a:endParaRPr>
+              </a:p>
+            </p:txBody>
+          </p:sp>
+          <p:sp>
+            <p:nvSpPr>
+              <p:cNvPr id="61" name="Rectangle: Rounded Corners 60">
+                <a:extLst>
+                  <a:ext uri="{FF2B5EF4-FFF2-40B4-BE49-F238E27FC236}">
+                    <a16:creationId xmlns:a16="http://schemas.microsoft.com/office/drawing/2014/main" id="{BE186BB0-8D92-4727-9B7E-7D30D57438C1}"/>
+                  </a:ext>
+                </a:extLst>
+              </p:cNvPr>
+              <p:cNvSpPr/>
+              <p:nvPr/>
+            </p:nvSpPr>
+            <p:spPr>
+              <a:xfrm>
+                <a:off x="431800" y="1855469"/>
+                <a:ext cx="498405" cy="238760"/>
+              </a:xfrm>
+              <a:prstGeom prst="roundRect">
+                <a:avLst/>
+              </a:prstGeom>
+              <a:solidFill>
+                <a:srgbClr val="E6EE9C"/>
+              </a:solidFill>
+              <a:ln>
+                <a:noFill/>
+              </a:ln>
+            </p:spPr>
+            <p:style>
+              <a:lnRef idx="2">
+                <a:schemeClr val="accent1">
+                  <a:shade val="50000"/>
+                </a:schemeClr>
+              </a:lnRef>
+              <a:fillRef idx="1">
+                <a:schemeClr val="accent1"/>
+              </a:fillRef>
+              <a:effectRef idx="0">
+                <a:schemeClr val="accent1"/>
+              </a:effectRef>
+              <a:fontRef idx="minor">
+                <a:schemeClr val="lt1"/>
+              </a:fontRef>
+            </p:style>
+            <p:txBody>
+              <a:bodyPr rtlCol="0" anchor="ctr"/>
+              <a:lstStyle/>
+              <a:p>
+                <a:pPr algn="ctr"/>
+                <a:r>
+                  <a:rPr lang="en-US" sz="800" b="1" dirty="0">
+                    <a:solidFill>
+                      <a:srgbClr val="212121"/>
+                    </a:solidFill>
+                    <a:latin typeface="Roboto" panose="02000000000000000000" pitchFamily="2" charset="0"/>
+                    <a:ea typeface="Roboto" panose="02000000000000000000" pitchFamily="2" charset="0"/>
+                  </a:rPr>
+                  <a:t>GET</a:t>
+                </a:r>
+              </a:p>
+            </p:txBody>
+          </p:sp>
+        </p:grpSp>
+        <p:cxnSp>
+          <p:nvCxnSpPr>
+            <p:cNvPr id="59" name="Straight Arrow Connector 58">
+              <a:extLst>
+                <a:ext uri="{FF2B5EF4-FFF2-40B4-BE49-F238E27FC236}">
+                  <a16:creationId xmlns:a16="http://schemas.microsoft.com/office/drawing/2014/main" id="{751B8E25-6A79-4607-B97A-36CD0B33F50A}"/>
+                </a:ext>
+              </a:extLst>
+            </p:cNvPr>
+            <p:cNvCxnSpPr>
+              <a:cxnSpLocks/>
+            </p:cNvCxnSpPr>
+            <p:nvPr/>
+          </p:nvCxnSpPr>
+          <p:spPr>
+            <a:xfrm>
+              <a:off x="7446561" y="5535098"/>
+              <a:ext cx="720437" cy="0"/>
+            </a:xfrm>
+            <a:prstGeom prst="straightConnector1">
+              <a:avLst/>
+            </a:prstGeom>
+            <a:ln w="22225" cap="rnd">
+              <a:solidFill>
+                <a:schemeClr val="tx1">
+                  <a:lumMod val="65000"/>
+                  <a:lumOff val="35000"/>
+                </a:schemeClr>
+              </a:solidFill>
+              <a:round/>
+              <a:tailEnd type="triangle" w="lg" len="med"/>
+            </a:ln>
+          </p:spPr>
+          <p:style>
+            <a:lnRef idx="1">
+              <a:schemeClr val="accent1"/>
+            </a:lnRef>
+            <a:fillRef idx="0">
+              <a:schemeClr val="accent1"/>
+            </a:fillRef>
+            <a:effectRef idx="0">
+              <a:schemeClr val="accent1"/>
+            </a:effectRef>
+            <a:fontRef idx="minor">
+              <a:schemeClr val="tx1"/>
+            </a:fontRef>
+          </p:style>
+        </p:cxnSp>
+        <p:sp>
+          <p:nvSpPr>
+            <p:cNvPr id="70" name="TextBox 69">
+              <a:extLst>
+                <a:ext uri="{FF2B5EF4-FFF2-40B4-BE49-F238E27FC236}">
+                  <a16:creationId xmlns:a16="http://schemas.microsoft.com/office/drawing/2014/main" id="{9224345F-4815-4E95-AC89-61274D38709B}"/>
+                </a:ext>
+              </a:extLst>
+            </p:cNvPr>
+            <p:cNvSpPr txBox="1"/>
+            <p:nvPr/>
+          </p:nvSpPr>
+          <p:spPr>
+            <a:xfrm>
+              <a:off x="10321805" y="5215002"/>
+              <a:ext cx="324128" cy="584775"/>
+            </a:xfrm>
+            <a:prstGeom prst="rect">
+              <a:avLst/>
+            </a:prstGeom>
+            <a:noFill/>
+          </p:spPr>
+          <p:txBody>
+            <a:bodyPr wrap="none" rtlCol="0">
+              <a:spAutoFit/>
+            </a:bodyPr>
+            <a:lstStyle/>
+            <a:p>
+              <a:r>
+                <a:rPr lang="en-US" sz="3200" dirty="0">
+                  <a:solidFill>
+                    <a:srgbClr val="595959"/>
+                  </a:solidFill>
+                  <a:latin typeface="Roboto Medium" panose="02000000000000000000" pitchFamily="2" charset="0"/>
+                  <a:ea typeface="Roboto Medium" panose="02000000000000000000" pitchFamily="2" charset="0"/>
+                </a:rPr>
+                <a:t>-</a:t>
+              </a:r>
+            </a:p>
+          </p:txBody>
+        </p:sp>
+      </p:grpSp>
     </p:spTree>
     <p:extLst>
       <p:ext uri="{BB962C8B-B14F-4D97-AF65-F5344CB8AC3E}">
@@ -17512,7 +18059,7 @@
                                           </p:stCondLst>
                                         </p:cTn>
                                         <p:tgtEl>
-                                          <p:spTgt spid="80"/>
+                                          <p:spTgt spid="5"/>
                                         </p:tgtEl>
                                         <p:attrNameLst>
                                           <p:attrName>style.visibility</p:attrName>
@@ -17557,7 +18104,7 @@
                                           </p:stCondLst>
                                         </p:cTn>
                                         <p:tgtEl>
-                                          <p:spTgt spid="81"/>
+                                          <p:spTgt spid="17"/>
                                         </p:tgtEl>
                                         <p:attrNameLst>
                                           <p:attrName>style.visibility</p:attrName>
@@ -17602,7 +18149,7 @@
                                           </p:stCondLst>
                                         </p:cTn>
                                         <p:tgtEl>
-                                          <p:spTgt spid="82"/>
+                                          <p:spTgt spid="26"/>
                                         </p:tgtEl>
                                         <p:attrNameLst>
                                           <p:attrName>style.visibility</p:attrName>

</xml_diff>